<commit_message>
final draft of README with all the documentation
</commit_message>
<xml_diff>
--- a/Documentation/Project pitches_04_ENRGCLIM21_NEST data-driven building model.pptx
+++ b/Documentation/Project pitches_04_ENRGCLIM21_NEST data-driven building model.pptx
@@ -5,7 +5,7 @@
     <p:sldMasterId id="2147483661" r:id="rId1"/>
   </p:sldMasterIdLst>
   <p:notesMasterIdLst>
-    <p:notesMasterId r:id="rId10"/>
+    <p:notesMasterId r:id="rId7"/>
   </p:notesMasterIdLst>
   <p:sldIdLst>
     <p:sldId id="268" r:id="rId2"/>
@@ -13,40 +13,37 @@
     <p:sldId id="273" r:id="rId4"/>
     <p:sldId id="274" r:id="rId5"/>
     <p:sldId id="275" r:id="rId6"/>
-    <p:sldId id="269" r:id="rId7"/>
-    <p:sldId id="270" r:id="rId8"/>
-    <p:sldId id="271" r:id="rId9"/>
   </p:sldIdLst>
   <p:sldSz cx="9144000" cy="5143500" type="screen16x9"/>
   <p:notesSz cx="6858000" cy="9144000"/>
   <p:embeddedFontLst>
     <p:embeddedFont>
       <p:font typeface="Calibri" panose="020F0502020204030204" pitchFamily="34" charset="0"/>
-      <p:regular r:id="rId11"/>
-      <p:bold r:id="rId12"/>
-      <p:italic r:id="rId13"/>
-      <p:boldItalic r:id="rId14"/>
+      <p:regular r:id="rId8"/>
+      <p:bold r:id="rId9"/>
+      <p:italic r:id="rId10"/>
+      <p:boldItalic r:id="rId11"/>
     </p:embeddedFont>
     <p:embeddedFont>
       <p:font typeface="Open Sans" panose="020B0606030504020204" pitchFamily="34" charset="0"/>
-      <p:regular r:id="rId15"/>
-      <p:bold r:id="rId16"/>
-      <p:italic r:id="rId17"/>
-      <p:boldItalic r:id="rId18"/>
+      <p:regular r:id="rId12"/>
+      <p:bold r:id="rId13"/>
+      <p:italic r:id="rId14"/>
+      <p:boldItalic r:id="rId15"/>
     </p:embeddedFont>
     <p:embeddedFont>
       <p:font typeface="Open Sans SemiBold" panose="020B0706030804020204" pitchFamily="34" charset="0"/>
-      <p:regular r:id="rId19"/>
-      <p:bold r:id="rId20"/>
-      <p:italic r:id="rId21"/>
-      <p:boldItalic r:id="rId22"/>
+      <p:regular r:id="rId16"/>
+      <p:bold r:id="rId17"/>
+      <p:italic r:id="rId18"/>
+      <p:boldItalic r:id="rId19"/>
     </p:embeddedFont>
     <p:embeddedFont>
       <p:font typeface="Roboto" panose="02000000000000000000" pitchFamily="2" charset="0"/>
-      <p:regular r:id="rId23"/>
-      <p:bold r:id="rId24"/>
-      <p:italic r:id="rId25"/>
-      <p:boldItalic r:id="rId26"/>
+      <p:regular r:id="rId20"/>
+      <p:bold r:id="rId21"/>
+      <p:italic r:id="rId22"/>
+      <p:boldItalic r:id="rId23"/>
     </p:embeddedFont>
   </p:embeddedFontLst>
   <p:defaultTextStyle>
@@ -284,6 +281,11 @@
         <p15:guide id="1">
           <p15:clr>
             <a:srgbClr val="9AA0A6"/>
+          </p15:clr>
+        </p15:guide>
+        <p15:guide id="2" orient="horz" pos="1620">
+          <p15:clr>
+            <a:srgbClr val="A4A3A4"/>
           </p15:clr>
         </p15:guide>
       </p15:sldGuideLst>
@@ -1286,330 +1288,6 @@
         <p14:creationId xmlns:p14="http://schemas.microsoft.com/office/powerpoint/2010/main" val="3054490963"/>
       </p:ext>
     </p:extLst>
-  </p:cSld>
-  <p:clrMapOvr>
-    <a:masterClrMapping/>
-  </p:clrMapOvr>
-</p:notes>
-</file>
-
-<file path=ppt/notesSlides/notesSlide6.xml><?xml version="1.0" encoding="utf-8"?>
-<p:notes xmlns:a="http://schemas.openxmlformats.org/drawingml/2006/main" xmlns:r="http://schemas.openxmlformats.org/officeDocument/2006/relationships" xmlns:p="http://schemas.openxmlformats.org/presentationml/2006/main" showMasterSp="0" showMasterPhAnim="0">
-  <p:cSld>
-    <p:spTree>
-      <p:nvGrpSpPr>
-        <p:cNvPr id="1" name="Shape 181"/>
-        <p:cNvGrpSpPr/>
-        <p:nvPr/>
-      </p:nvGrpSpPr>
-      <p:grpSpPr>
-        <a:xfrm>
-          <a:off x="0" y="0"/>
-          <a:ext cx="0" cy="0"/>
-          <a:chOff x="0" y="0"/>
-          <a:chExt cx="0" cy="0"/>
-        </a:xfrm>
-      </p:grpSpPr>
-      <p:sp>
-        <p:nvSpPr>
-          <p:cNvPr id="182" name="Google Shape;182;gcb070c9b23_0_65:notes"/>
-          <p:cNvSpPr txBox="1">
-            <a:spLocks noGrp="1"/>
-          </p:cNvSpPr>
-          <p:nvPr>
-            <p:ph type="body" idx="1"/>
-          </p:nvPr>
-        </p:nvSpPr>
-        <p:spPr>
-          <a:xfrm>
-            <a:off x="685800" y="4400550"/>
-            <a:ext cx="5486400" cy="3600600"/>
-          </a:xfrm>
-          <a:prstGeom prst="rect">
-            <a:avLst/>
-          </a:prstGeom>
-          <a:noFill/>
-          <a:ln>
-            <a:noFill/>
-          </a:ln>
-        </p:spPr>
-        <p:txBody>
-          <a:bodyPr spcFirstLastPara="1" wrap="square" lIns="91425" tIns="91425" rIns="91425" bIns="91425" anchor="ctr" anchorCtr="0">
-            <a:noAutofit/>
-          </a:bodyPr>
-          <a:lstStyle/>
-          <a:p>
-            <a:pPr marL="0" lvl="0" indent="0" algn="l" rtl="0">
-              <a:spcBef>
-                <a:spcPts val="0"/>
-              </a:spcBef>
-              <a:spcAft>
-                <a:spcPts val="0"/>
-              </a:spcAft>
-              <a:buNone/>
-            </a:pPr>
-            <a:endParaRPr/>
-          </a:p>
-        </p:txBody>
-      </p:sp>
-      <p:sp>
-        <p:nvSpPr>
-          <p:cNvPr id="183" name="Google Shape;183;gcb070c9b23_0_65:notes"/>
-          <p:cNvSpPr>
-            <a:spLocks noGrp="1" noRot="1" noChangeAspect="1"/>
-          </p:cNvSpPr>
-          <p:nvPr>
-            <p:ph type="sldImg" idx="2"/>
-          </p:nvPr>
-        </p:nvSpPr>
-        <p:spPr>
-          <a:xfrm>
-            <a:off x="685800" y="1143000"/>
-            <a:ext cx="5486400" cy="3086100"/>
-          </a:xfrm>
-          <a:custGeom>
-            <a:avLst/>
-            <a:gdLst/>
-            <a:ahLst/>
-            <a:cxnLst/>
-            <a:rect l="l" t="t" r="r" b="b"/>
-            <a:pathLst>
-              <a:path w="120000" h="120000" extrusionOk="0">
-                <a:moveTo>
-                  <a:pt x="0" y="0"/>
-                </a:moveTo>
-                <a:lnTo>
-                  <a:pt x="120000" y="0"/>
-                </a:lnTo>
-                <a:lnTo>
-                  <a:pt x="120000" y="120000"/>
-                </a:lnTo>
-                <a:lnTo>
-                  <a:pt x="0" y="120000"/>
-                </a:lnTo>
-                <a:close/>
-              </a:path>
-            </a:pathLst>
-          </a:custGeom>
-        </p:spPr>
-      </p:sp>
-    </p:spTree>
-  </p:cSld>
-  <p:clrMapOvr>
-    <a:masterClrMapping/>
-  </p:clrMapOvr>
-</p:notes>
-</file>
-
-<file path=ppt/notesSlides/notesSlide7.xml><?xml version="1.0" encoding="utf-8"?>
-<p:notes xmlns:a="http://schemas.openxmlformats.org/drawingml/2006/main" xmlns:r="http://schemas.openxmlformats.org/officeDocument/2006/relationships" xmlns:p="http://schemas.openxmlformats.org/presentationml/2006/main" showMasterSp="0" showMasterPhAnim="0">
-  <p:cSld>
-    <p:spTree>
-      <p:nvGrpSpPr>
-        <p:cNvPr id="1" name="Shape 190"/>
-        <p:cNvGrpSpPr/>
-        <p:nvPr/>
-      </p:nvGrpSpPr>
-      <p:grpSpPr>
-        <a:xfrm>
-          <a:off x="0" y="0"/>
-          <a:ext cx="0" cy="0"/>
-          <a:chOff x="0" y="0"/>
-          <a:chExt cx="0" cy="0"/>
-        </a:xfrm>
-      </p:grpSpPr>
-      <p:sp>
-        <p:nvSpPr>
-          <p:cNvPr id="191" name="Google Shape;191;gcb070c9b23_0_71:notes"/>
-          <p:cNvSpPr txBox="1">
-            <a:spLocks noGrp="1"/>
-          </p:cNvSpPr>
-          <p:nvPr>
-            <p:ph type="body" idx="1"/>
-          </p:nvPr>
-        </p:nvSpPr>
-        <p:spPr>
-          <a:xfrm>
-            <a:off x="685800" y="4400550"/>
-            <a:ext cx="5486400" cy="3600600"/>
-          </a:xfrm>
-          <a:prstGeom prst="rect">
-            <a:avLst/>
-          </a:prstGeom>
-          <a:noFill/>
-          <a:ln>
-            <a:noFill/>
-          </a:ln>
-        </p:spPr>
-        <p:txBody>
-          <a:bodyPr spcFirstLastPara="1" wrap="square" lIns="91425" tIns="91425" rIns="91425" bIns="91425" anchor="ctr" anchorCtr="0">
-            <a:noAutofit/>
-          </a:bodyPr>
-          <a:lstStyle/>
-          <a:p>
-            <a:pPr marL="0" lvl="0" indent="0" algn="l" rtl="0">
-              <a:spcBef>
-                <a:spcPts val="0"/>
-              </a:spcBef>
-              <a:spcAft>
-                <a:spcPts val="0"/>
-              </a:spcAft>
-              <a:buNone/>
-            </a:pPr>
-            <a:endParaRPr/>
-          </a:p>
-        </p:txBody>
-      </p:sp>
-      <p:sp>
-        <p:nvSpPr>
-          <p:cNvPr id="192" name="Google Shape;192;gcb070c9b23_0_71:notes"/>
-          <p:cNvSpPr>
-            <a:spLocks noGrp="1" noRot="1" noChangeAspect="1"/>
-          </p:cNvSpPr>
-          <p:nvPr>
-            <p:ph type="sldImg" idx="2"/>
-          </p:nvPr>
-        </p:nvSpPr>
-        <p:spPr>
-          <a:xfrm>
-            <a:off x="685800" y="1143000"/>
-            <a:ext cx="5486400" cy="3086100"/>
-          </a:xfrm>
-          <a:custGeom>
-            <a:avLst/>
-            <a:gdLst/>
-            <a:ahLst/>
-            <a:cxnLst/>
-            <a:rect l="l" t="t" r="r" b="b"/>
-            <a:pathLst>
-              <a:path w="120000" h="120000" extrusionOk="0">
-                <a:moveTo>
-                  <a:pt x="0" y="0"/>
-                </a:moveTo>
-                <a:lnTo>
-                  <a:pt x="120000" y="0"/>
-                </a:lnTo>
-                <a:lnTo>
-                  <a:pt x="120000" y="120000"/>
-                </a:lnTo>
-                <a:lnTo>
-                  <a:pt x="0" y="120000"/>
-                </a:lnTo>
-                <a:close/>
-              </a:path>
-            </a:pathLst>
-          </a:custGeom>
-        </p:spPr>
-      </p:sp>
-    </p:spTree>
-  </p:cSld>
-  <p:clrMapOvr>
-    <a:masterClrMapping/>
-  </p:clrMapOvr>
-</p:notes>
-</file>
-
-<file path=ppt/notesSlides/notesSlide8.xml><?xml version="1.0" encoding="utf-8"?>
-<p:notes xmlns:a="http://schemas.openxmlformats.org/drawingml/2006/main" xmlns:r="http://schemas.openxmlformats.org/officeDocument/2006/relationships" xmlns:p="http://schemas.openxmlformats.org/presentationml/2006/main" showMasterSp="0" showMasterPhAnim="0">
-  <p:cSld>
-    <p:spTree>
-      <p:nvGrpSpPr>
-        <p:cNvPr id="1" name="Shape 199"/>
-        <p:cNvGrpSpPr/>
-        <p:nvPr/>
-      </p:nvGrpSpPr>
-      <p:grpSpPr>
-        <a:xfrm>
-          <a:off x="0" y="0"/>
-          <a:ext cx="0" cy="0"/>
-          <a:chOff x="0" y="0"/>
-          <a:chExt cx="0" cy="0"/>
-        </a:xfrm>
-      </p:grpSpPr>
-      <p:sp>
-        <p:nvSpPr>
-          <p:cNvPr id="200" name="Google Shape;200;gcb070c9b23_0_77:notes"/>
-          <p:cNvSpPr txBox="1">
-            <a:spLocks noGrp="1"/>
-          </p:cNvSpPr>
-          <p:nvPr>
-            <p:ph type="body" idx="1"/>
-          </p:nvPr>
-        </p:nvSpPr>
-        <p:spPr>
-          <a:xfrm>
-            <a:off x="685800" y="4400550"/>
-            <a:ext cx="5486400" cy="3600600"/>
-          </a:xfrm>
-          <a:prstGeom prst="rect">
-            <a:avLst/>
-          </a:prstGeom>
-          <a:noFill/>
-          <a:ln>
-            <a:noFill/>
-          </a:ln>
-        </p:spPr>
-        <p:txBody>
-          <a:bodyPr spcFirstLastPara="1" wrap="square" lIns="91425" tIns="91425" rIns="91425" bIns="91425" anchor="ctr" anchorCtr="0">
-            <a:noAutofit/>
-          </a:bodyPr>
-          <a:lstStyle/>
-          <a:p>
-            <a:pPr marL="0" lvl="0" indent="0" algn="l" rtl="0">
-              <a:spcBef>
-                <a:spcPts val="0"/>
-              </a:spcBef>
-              <a:spcAft>
-                <a:spcPts val="0"/>
-              </a:spcAft>
-              <a:buNone/>
-            </a:pPr>
-            <a:endParaRPr/>
-          </a:p>
-        </p:txBody>
-      </p:sp>
-      <p:sp>
-        <p:nvSpPr>
-          <p:cNvPr id="201" name="Google Shape;201;gcb070c9b23_0_77:notes"/>
-          <p:cNvSpPr>
-            <a:spLocks noGrp="1" noRot="1" noChangeAspect="1"/>
-          </p:cNvSpPr>
-          <p:nvPr>
-            <p:ph type="sldImg" idx="2"/>
-          </p:nvPr>
-        </p:nvSpPr>
-        <p:spPr>
-          <a:xfrm>
-            <a:off x="685800" y="1143000"/>
-            <a:ext cx="5486400" cy="3086100"/>
-          </a:xfrm>
-          <a:custGeom>
-            <a:avLst/>
-            <a:gdLst/>
-            <a:ahLst/>
-            <a:cxnLst/>
-            <a:rect l="l" t="t" r="r" b="b"/>
-            <a:pathLst>
-              <a:path w="120000" h="120000" extrusionOk="0">
-                <a:moveTo>
-                  <a:pt x="0" y="0"/>
-                </a:moveTo>
-                <a:lnTo>
-                  <a:pt x="120000" y="0"/>
-                </a:lnTo>
-                <a:lnTo>
-                  <a:pt x="120000" y="120000"/>
-                </a:lnTo>
-                <a:lnTo>
-                  <a:pt x="0" y="120000"/>
-                </a:lnTo>
-                <a:close/>
-              </a:path>
-            </a:pathLst>
-          </a:custGeom>
-        </p:spPr>
-      </p:sp>
-    </p:spTree>
   </p:cSld>
   <p:clrMapOvr>
     <a:masterClrMapping/>
@@ -9904,1463 +9582,6 @@
 </p:sld>
 </file>
 
-<file path=ppt/slides/slide6.xml><?xml version="1.0" encoding="utf-8"?>
-<p:sld xmlns:a="http://schemas.openxmlformats.org/drawingml/2006/main" xmlns:r="http://schemas.openxmlformats.org/officeDocument/2006/relationships" xmlns:p="http://schemas.openxmlformats.org/presentationml/2006/main">
-  <p:cSld>
-    <p:bg>
-      <p:bgPr>
-        <a:solidFill>
-          <a:srgbClr val="FFFFFF"/>
-        </a:solidFill>
-        <a:effectLst/>
-      </p:bgPr>
-    </p:bg>
-    <p:spTree>
-      <p:nvGrpSpPr>
-        <p:cNvPr id="1" name="Shape 184"/>
-        <p:cNvGrpSpPr/>
-        <p:nvPr/>
-      </p:nvGrpSpPr>
-      <p:grpSpPr>
-        <a:xfrm>
-          <a:off x="0" y="0"/>
-          <a:ext cx="0" cy="0"/>
-          <a:chOff x="0" y="0"/>
-          <a:chExt cx="0" cy="0"/>
-        </a:xfrm>
-      </p:grpSpPr>
-      <p:pic>
-        <p:nvPicPr>
-          <p:cNvPr id="185" name="Google Shape;185;p28"/>
-          <p:cNvPicPr preferRelativeResize="0"/>
-          <p:nvPr/>
-        </p:nvPicPr>
-        <p:blipFill>
-          <a:blip r:embed="rId3">
-            <a:alphaModFix/>
-          </a:blip>
-          <a:stretch>
-            <a:fillRect/>
-          </a:stretch>
-        </p:blipFill>
-        <p:spPr>
-          <a:xfrm>
-            <a:off x="0" y="0"/>
-            <a:ext cx="9144003" cy="5143501"/>
-          </a:xfrm>
-          <a:prstGeom prst="rect">
-            <a:avLst/>
-          </a:prstGeom>
-          <a:noFill/>
-          <a:ln>
-            <a:noFill/>
-          </a:ln>
-        </p:spPr>
-      </p:pic>
-      <p:sp>
-        <p:nvSpPr>
-          <p:cNvPr id="186" name="Google Shape;186;p28"/>
-          <p:cNvSpPr txBox="1">
-            <a:spLocks noGrp="1"/>
-          </p:cNvSpPr>
-          <p:nvPr>
-            <p:ph type="body" idx="4294967295"/>
-          </p:nvPr>
-        </p:nvSpPr>
-        <p:spPr>
-          <a:xfrm>
-            <a:off x="420800" y="546375"/>
-            <a:ext cx="6571200" cy="4424100"/>
-          </a:xfrm>
-          <a:prstGeom prst="rect">
-            <a:avLst/>
-          </a:prstGeom>
-          <a:noFill/>
-          <a:ln>
-            <a:noFill/>
-          </a:ln>
-        </p:spPr>
-        <p:txBody>
-          <a:bodyPr spcFirstLastPara="1" wrap="square" lIns="68575" tIns="34275" rIns="68575" bIns="34275" anchor="t" anchorCtr="0">
-            <a:noAutofit/>
-          </a:bodyPr>
-          <a:lstStyle/>
-          <a:p>
-            <a:pPr marL="0" marR="0" lvl="0" indent="0" algn="l" rtl="0">
-              <a:lnSpc>
-                <a:spcPct val="100000"/>
-              </a:lnSpc>
-              <a:spcBef>
-                <a:spcPts val="0"/>
-              </a:spcBef>
-              <a:spcAft>
-                <a:spcPts val="0"/>
-              </a:spcAft>
-              <a:buClr>
-                <a:schemeClr val="dk1"/>
-              </a:buClr>
-              <a:buFont typeface="Arial"/>
-              <a:buNone/>
-            </a:pPr>
-            <a:r>
-              <a:rPr lang="de" sz="2800" b="1" dirty="0">
-                <a:solidFill>
-                  <a:srgbClr val="000000"/>
-                </a:solidFill>
-              </a:rPr>
-              <a:t>The Challenge</a:t>
-            </a:r>
-            <a:endParaRPr sz="2800" b="1" dirty="0">
-              <a:solidFill>
-                <a:srgbClr val="000000"/>
-              </a:solidFill>
-            </a:endParaRPr>
-          </a:p>
-          <a:p>
-            <a:pPr marL="457200" lvl="0" indent="-342900" algn="l" rtl="0">
-              <a:spcBef>
-                <a:spcPts val="1200"/>
-              </a:spcBef>
-              <a:spcAft>
-                <a:spcPts val="0"/>
-              </a:spcAft>
-              <a:buClr>
-                <a:schemeClr val="dk1"/>
-              </a:buClr>
-              <a:buSzPts val="1800"/>
-              <a:buChar char="-"/>
-            </a:pPr>
-            <a:r>
-              <a:rPr lang="de" dirty="0">
-                <a:solidFill>
-                  <a:schemeClr val="dk1"/>
-                </a:solidFill>
-              </a:rPr>
-              <a:t>Dezentralisierung: Zurück ins Quartier? </a:t>
-            </a:r>
-            <a:endParaRPr dirty="0">
-              <a:solidFill>
-                <a:schemeClr val="dk1"/>
-              </a:solidFill>
-            </a:endParaRPr>
-          </a:p>
-          <a:p>
-            <a:pPr marL="457200" lvl="0" indent="-342900" algn="l" rtl="0">
-              <a:spcBef>
-                <a:spcPts val="0"/>
-              </a:spcBef>
-              <a:spcAft>
-                <a:spcPts val="0"/>
-              </a:spcAft>
-              <a:buClr>
-                <a:schemeClr val="dk1"/>
-              </a:buClr>
-              <a:buSzPts val="1800"/>
-              <a:buChar char="-"/>
-            </a:pPr>
-            <a:r>
-              <a:rPr lang="de" dirty="0">
-                <a:solidFill>
-                  <a:schemeClr val="dk1"/>
-                </a:solidFill>
-              </a:rPr>
-              <a:t>Halböffentliche Mini Containers bieten vielleicht mehr Kontrolle? </a:t>
-            </a:r>
-            <a:endParaRPr dirty="0">
-              <a:solidFill>
-                <a:schemeClr val="dk1"/>
-              </a:solidFill>
-            </a:endParaRPr>
-          </a:p>
-          <a:p>
-            <a:pPr marL="457200" lvl="0" indent="-342900" algn="l" rtl="0">
-              <a:spcBef>
-                <a:spcPts val="0"/>
-              </a:spcBef>
-              <a:spcAft>
-                <a:spcPts val="0"/>
-              </a:spcAft>
-              <a:buClr>
-                <a:schemeClr val="dk1"/>
-              </a:buClr>
-              <a:buSzPts val="1800"/>
-              <a:buChar char="-"/>
-            </a:pPr>
-            <a:r>
-              <a:rPr lang="de" dirty="0">
-                <a:solidFill>
-                  <a:schemeClr val="dk1"/>
-                </a:solidFill>
-              </a:rPr>
-              <a:t>Hotline bei Funktionsstörungen oder bei Littering? </a:t>
-            </a:r>
-            <a:endParaRPr dirty="0">
-              <a:solidFill>
-                <a:schemeClr val="dk1"/>
-              </a:solidFill>
-            </a:endParaRPr>
-          </a:p>
-          <a:p>
-            <a:pPr marL="0" lvl="0" indent="0" algn="l" rtl="0">
-              <a:lnSpc>
-                <a:spcPct val="100000"/>
-              </a:lnSpc>
-              <a:spcBef>
-                <a:spcPts val="1200"/>
-              </a:spcBef>
-              <a:spcAft>
-                <a:spcPts val="0"/>
-              </a:spcAft>
-              <a:buNone/>
-            </a:pPr>
-            <a:r>
-              <a:rPr lang="de" sz="2800" b="1" dirty="0">
-                <a:solidFill>
-                  <a:schemeClr val="dk1"/>
-                </a:solidFill>
-              </a:rPr>
-              <a:t>The Idea</a:t>
-            </a:r>
-            <a:endParaRPr dirty="0">
-              <a:solidFill>
-                <a:schemeClr val="dk1"/>
-              </a:solidFill>
-            </a:endParaRPr>
-          </a:p>
-          <a:p>
-            <a:pPr marL="457200" lvl="0" indent="-342900" algn="l" rtl="0">
-              <a:spcBef>
-                <a:spcPts val="1200"/>
-              </a:spcBef>
-              <a:spcAft>
-                <a:spcPts val="0"/>
-              </a:spcAft>
-              <a:buClr>
-                <a:schemeClr val="dk1"/>
-              </a:buClr>
-              <a:buSzPts val="1800"/>
-              <a:buChar char="-"/>
-            </a:pPr>
-            <a:r>
-              <a:rPr lang="de" dirty="0">
-                <a:solidFill>
-                  <a:schemeClr val="dk1"/>
-                </a:solidFill>
-              </a:rPr>
-              <a:t>Geschichten und Infos vor Ort für Kinder und Erwachsene zu Themen wie Kreislaufwirtschaft, Umweltbewusstsein und Bastelanleitungen für Upcycling. </a:t>
-            </a:r>
-            <a:endParaRPr dirty="0">
-              <a:solidFill>
-                <a:schemeClr val="dk1"/>
-              </a:solidFill>
-            </a:endParaRPr>
-          </a:p>
-          <a:p>
-            <a:pPr marL="457200" lvl="0" indent="-342900" algn="l" rtl="0">
-              <a:spcBef>
-                <a:spcPts val="0"/>
-              </a:spcBef>
-              <a:spcAft>
-                <a:spcPts val="0"/>
-              </a:spcAft>
-              <a:buClr>
-                <a:schemeClr val="dk1"/>
-              </a:buClr>
-              <a:buSzPts val="1800"/>
-              <a:buChar char="-"/>
-            </a:pPr>
-            <a:r>
-              <a:rPr lang="de" dirty="0">
-                <a:solidFill>
-                  <a:schemeClr val="dk1"/>
-                </a:solidFill>
-              </a:rPr>
-              <a:t>Entsorgung als Erlebnis gestalten?</a:t>
-            </a:r>
-            <a:endParaRPr i="1" dirty="0">
-              <a:solidFill>
-                <a:schemeClr val="dk1"/>
-              </a:solidFill>
-            </a:endParaRPr>
-          </a:p>
-        </p:txBody>
-      </p:sp>
-      <p:sp>
-        <p:nvSpPr>
-          <p:cNvPr id="188" name="Google Shape;188;p28"/>
-          <p:cNvSpPr txBox="1">
-            <a:spLocks noGrp="1"/>
-          </p:cNvSpPr>
-          <p:nvPr>
-            <p:ph type="body" idx="4294967295"/>
-          </p:nvPr>
-        </p:nvSpPr>
-        <p:spPr>
-          <a:xfrm>
-            <a:off x="8303475" y="546375"/>
-            <a:ext cx="532200" cy="638700"/>
-          </a:xfrm>
-          <a:prstGeom prst="rect">
-            <a:avLst/>
-          </a:prstGeom>
-          <a:noFill/>
-          <a:ln>
-            <a:noFill/>
-          </a:ln>
-        </p:spPr>
-        <p:txBody>
-          <a:bodyPr spcFirstLastPara="1" wrap="square" lIns="68575" tIns="34275" rIns="68575" bIns="34275" anchor="t" anchorCtr="0">
-            <a:noAutofit/>
-          </a:bodyPr>
-          <a:lstStyle/>
-          <a:p>
-            <a:pPr marL="0" marR="0" lvl="0" indent="0" algn="l" rtl="0">
-              <a:lnSpc>
-                <a:spcPct val="100000"/>
-              </a:lnSpc>
-              <a:spcBef>
-                <a:spcPts val="0"/>
-              </a:spcBef>
-              <a:spcAft>
-                <a:spcPts val="0"/>
-              </a:spcAft>
-              <a:buClr>
-                <a:schemeClr val="dk1"/>
-              </a:buClr>
-              <a:buFont typeface="Arial"/>
-              <a:buNone/>
-            </a:pPr>
-            <a:r>
-              <a:rPr lang="de" sz="3200" b="1">
-                <a:solidFill>
-                  <a:srgbClr val="CC0000"/>
-                </a:solidFill>
-                <a:latin typeface="Roboto"/>
-                <a:ea typeface="Roboto"/>
-                <a:cs typeface="Roboto"/>
-                <a:sym typeface="Roboto"/>
-              </a:rPr>
-              <a:t>4</a:t>
-            </a:r>
-            <a:endParaRPr sz="2500" b="1" i="1">
-              <a:solidFill>
-                <a:srgbClr val="000000"/>
-              </a:solidFill>
-            </a:endParaRPr>
-          </a:p>
-          <a:p>
-            <a:pPr marL="0" lvl="0" indent="0" algn="l" rtl="0">
-              <a:spcBef>
-                <a:spcPts val="1200"/>
-              </a:spcBef>
-              <a:spcAft>
-                <a:spcPts val="1200"/>
-              </a:spcAft>
-              <a:buNone/>
-            </a:pPr>
-            <a:endParaRPr i="1">
-              <a:solidFill>
-                <a:schemeClr val="dk1"/>
-              </a:solidFill>
-            </a:endParaRPr>
-          </a:p>
-        </p:txBody>
-      </p:sp>
-      <p:sp>
-        <p:nvSpPr>
-          <p:cNvPr id="189" name="Google Shape;189;p28"/>
-          <p:cNvSpPr txBox="1">
-            <a:spLocks noGrp="1"/>
-          </p:cNvSpPr>
-          <p:nvPr>
-            <p:ph type="body" idx="4294967295"/>
-          </p:nvPr>
-        </p:nvSpPr>
-        <p:spPr>
-          <a:xfrm>
-            <a:off x="4799050" y="261125"/>
-            <a:ext cx="3846900" cy="389700"/>
-          </a:xfrm>
-          <a:prstGeom prst="rect">
-            <a:avLst/>
-          </a:prstGeom>
-          <a:noFill/>
-          <a:ln>
-            <a:noFill/>
-          </a:ln>
-        </p:spPr>
-        <p:txBody>
-          <a:bodyPr spcFirstLastPara="1" wrap="square" lIns="68575" tIns="34275" rIns="68575" bIns="34275" anchor="t" anchorCtr="0">
-            <a:noAutofit/>
-          </a:bodyPr>
-          <a:lstStyle/>
-          <a:p>
-            <a:pPr marL="0" lvl="0" indent="0" algn="r" rtl="0">
-              <a:lnSpc>
-                <a:spcPct val="120000"/>
-              </a:lnSpc>
-              <a:spcBef>
-                <a:spcPts val="0"/>
-              </a:spcBef>
-              <a:spcAft>
-                <a:spcPts val="0"/>
-              </a:spcAft>
-              <a:buClr>
-                <a:schemeClr val="dk1"/>
-              </a:buClr>
-              <a:buSzPts val="1100"/>
-              <a:buFont typeface="Arial"/>
-              <a:buNone/>
-            </a:pPr>
-            <a:r>
-              <a:rPr lang="de" b="1" i="1">
-                <a:solidFill>
-                  <a:srgbClr val="CC0000"/>
-                </a:solidFill>
-                <a:highlight>
-                  <a:srgbClr val="FFFFFF"/>
-                </a:highlight>
-                <a:latin typeface="Roboto"/>
-                <a:ea typeface="Roboto"/>
-                <a:cs typeface="Roboto"/>
-                <a:sym typeface="Roboto"/>
-              </a:rPr>
-              <a:t>Vertical Farming</a:t>
-            </a:r>
-            <a:endParaRPr b="1" i="1">
-              <a:solidFill>
-                <a:srgbClr val="CC0000"/>
-              </a:solidFill>
-              <a:highlight>
-                <a:srgbClr val="FFFFFF"/>
-              </a:highlight>
-              <a:latin typeface="Roboto"/>
-              <a:ea typeface="Roboto"/>
-              <a:cs typeface="Roboto"/>
-              <a:sym typeface="Roboto"/>
-            </a:endParaRPr>
-          </a:p>
-          <a:p>
-            <a:pPr marL="0" lvl="0" indent="0" algn="r" rtl="0">
-              <a:spcBef>
-                <a:spcPts val="1200"/>
-              </a:spcBef>
-              <a:spcAft>
-                <a:spcPts val="1200"/>
-              </a:spcAft>
-              <a:buNone/>
-            </a:pPr>
-            <a:endParaRPr i="1">
-              <a:solidFill>
-                <a:schemeClr val="dk1"/>
-              </a:solidFill>
-            </a:endParaRPr>
-          </a:p>
-        </p:txBody>
-      </p:sp>
-    </p:spTree>
-  </p:cSld>
-  <p:clrMapOvr>
-    <a:masterClrMapping/>
-  </p:clrMapOvr>
-</p:sld>
-</file>
-
-<file path=ppt/slides/slide7.xml><?xml version="1.0" encoding="utf-8"?>
-<p:sld xmlns:a="http://schemas.openxmlformats.org/drawingml/2006/main" xmlns:r="http://schemas.openxmlformats.org/officeDocument/2006/relationships" xmlns:p="http://schemas.openxmlformats.org/presentationml/2006/main">
-  <p:cSld>
-    <p:bg>
-      <p:bgPr>
-        <a:solidFill>
-          <a:srgbClr val="FFFFFF"/>
-        </a:solidFill>
-        <a:effectLst/>
-      </p:bgPr>
-    </p:bg>
-    <p:spTree>
-      <p:nvGrpSpPr>
-        <p:cNvPr id="1" name="Shape 193"/>
-        <p:cNvGrpSpPr/>
-        <p:nvPr/>
-      </p:nvGrpSpPr>
-      <p:grpSpPr>
-        <a:xfrm>
-          <a:off x="0" y="0"/>
-          <a:ext cx="0" cy="0"/>
-          <a:chOff x="0" y="0"/>
-          <a:chExt cx="0" cy="0"/>
-        </a:xfrm>
-      </p:grpSpPr>
-      <p:pic>
-        <p:nvPicPr>
-          <p:cNvPr id="194" name="Google Shape;194;p29"/>
-          <p:cNvPicPr preferRelativeResize="0"/>
-          <p:nvPr/>
-        </p:nvPicPr>
-        <p:blipFill>
-          <a:blip r:embed="rId3">
-            <a:alphaModFix/>
-          </a:blip>
-          <a:stretch>
-            <a:fillRect/>
-          </a:stretch>
-        </p:blipFill>
-        <p:spPr>
-          <a:xfrm>
-            <a:off x="0" y="0"/>
-            <a:ext cx="9144003" cy="5143501"/>
-          </a:xfrm>
-          <a:prstGeom prst="rect">
-            <a:avLst/>
-          </a:prstGeom>
-          <a:noFill/>
-          <a:ln>
-            <a:noFill/>
-          </a:ln>
-        </p:spPr>
-      </p:pic>
-      <p:sp>
-        <p:nvSpPr>
-          <p:cNvPr id="195" name="Google Shape;195;p29"/>
-          <p:cNvSpPr txBox="1">
-            <a:spLocks noGrp="1"/>
-          </p:cNvSpPr>
-          <p:nvPr>
-            <p:ph type="body" idx="4294967295"/>
-          </p:nvPr>
-        </p:nvSpPr>
-        <p:spPr>
-          <a:xfrm>
-            <a:off x="420800" y="546375"/>
-            <a:ext cx="6571200" cy="3750900"/>
-          </a:xfrm>
-          <a:prstGeom prst="rect">
-            <a:avLst/>
-          </a:prstGeom>
-          <a:noFill/>
-          <a:ln>
-            <a:noFill/>
-          </a:ln>
-        </p:spPr>
-        <p:txBody>
-          <a:bodyPr spcFirstLastPara="1" wrap="square" lIns="68575" tIns="34275" rIns="68575" bIns="34275" anchor="t" anchorCtr="0">
-            <a:noAutofit/>
-          </a:bodyPr>
-          <a:lstStyle/>
-          <a:p>
-            <a:pPr marL="0" marR="0" lvl="0" indent="0" algn="l" rtl="0">
-              <a:lnSpc>
-                <a:spcPct val="100000"/>
-              </a:lnSpc>
-              <a:spcBef>
-                <a:spcPts val="0"/>
-              </a:spcBef>
-              <a:spcAft>
-                <a:spcPts val="0"/>
-              </a:spcAft>
-              <a:buClr>
-                <a:schemeClr val="dk1"/>
-              </a:buClr>
-              <a:buFont typeface="Arial"/>
-              <a:buNone/>
-            </a:pPr>
-            <a:r>
-              <a:rPr lang="de" sz="2800" b="1" dirty="0">
-                <a:solidFill>
-                  <a:srgbClr val="000000"/>
-                </a:solidFill>
-              </a:rPr>
-              <a:t>What we did</a:t>
-            </a:r>
-            <a:endParaRPr sz="2800" b="1" dirty="0">
-              <a:solidFill>
-                <a:srgbClr val="000000"/>
-              </a:solidFill>
-            </a:endParaRPr>
-          </a:p>
-          <a:p>
-            <a:pPr marL="457200" lvl="0" indent="-342900" algn="l" rtl="0">
-              <a:spcBef>
-                <a:spcPts val="1200"/>
-              </a:spcBef>
-              <a:spcAft>
-                <a:spcPts val="0"/>
-              </a:spcAft>
-              <a:buClr>
-                <a:schemeClr val="dk1"/>
-              </a:buClr>
-              <a:buSzPts val="1800"/>
-              <a:buChar char="-"/>
-            </a:pPr>
-            <a:r>
-              <a:rPr lang="de" dirty="0">
-                <a:solidFill>
-                  <a:schemeClr val="dk1"/>
-                </a:solidFill>
-              </a:rPr>
-              <a:t>Dezentralisierung </a:t>
-            </a:r>
-            <a:endParaRPr dirty="0">
-              <a:solidFill>
-                <a:schemeClr val="dk1"/>
-              </a:solidFill>
-            </a:endParaRPr>
-          </a:p>
-          <a:p>
-            <a:pPr marL="457200" lvl="0" indent="-342900" algn="l" rtl="0">
-              <a:spcBef>
-                <a:spcPts val="0"/>
-              </a:spcBef>
-              <a:spcAft>
-                <a:spcPts val="0"/>
-              </a:spcAft>
-              <a:buClr>
-                <a:schemeClr val="dk1"/>
-              </a:buClr>
-              <a:buSzPts val="1800"/>
-              <a:buChar char="-"/>
-            </a:pPr>
-            <a:r>
-              <a:rPr lang="de" dirty="0">
-                <a:solidFill>
-                  <a:schemeClr val="dk1"/>
-                </a:solidFill>
-              </a:rPr>
-              <a:t>Halböffentliche Mini Containers bieten mehr Kontrolle</a:t>
-            </a:r>
-            <a:endParaRPr dirty="0">
-              <a:solidFill>
-                <a:schemeClr val="dk1"/>
-              </a:solidFill>
-            </a:endParaRPr>
-          </a:p>
-          <a:p>
-            <a:pPr marL="457200" lvl="0" indent="-342900" algn="l" rtl="0">
-              <a:spcBef>
-                <a:spcPts val="0"/>
-              </a:spcBef>
-              <a:spcAft>
-                <a:spcPts val="0"/>
-              </a:spcAft>
-              <a:buClr>
-                <a:schemeClr val="dk1"/>
-              </a:buClr>
-              <a:buSzPts val="1800"/>
-              <a:buChar char="-"/>
-            </a:pPr>
-            <a:r>
-              <a:rPr lang="de" dirty="0">
-                <a:solidFill>
-                  <a:schemeClr val="dk1"/>
-                </a:solidFill>
-              </a:rPr>
-              <a:t>Hotline bei Funktionsstörungen. </a:t>
-            </a:r>
-            <a:endParaRPr dirty="0">
-              <a:solidFill>
-                <a:schemeClr val="dk1"/>
-              </a:solidFill>
-            </a:endParaRPr>
-          </a:p>
-          <a:p>
-            <a:pPr marL="457200" lvl="0" indent="-342900" algn="l" rtl="0">
-              <a:spcBef>
-                <a:spcPts val="0"/>
-              </a:spcBef>
-              <a:spcAft>
-                <a:spcPts val="0"/>
-              </a:spcAft>
-              <a:buClr>
-                <a:schemeClr val="dk1"/>
-              </a:buClr>
-              <a:buSzPts val="1800"/>
-              <a:buChar char="-"/>
-            </a:pPr>
-            <a:r>
-              <a:rPr lang="de" dirty="0">
-                <a:solidFill>
-                  <a:schemeClr val="dk1"/>
-                </a:solidFill>
-              </a:rPr>
-              <a:t>Meldung via IoT-Sensoren </a:t>
-            </a:r>
-            <a:endParaRPr dirty="0">
-              <a:solidFill>
-                <a:schemeClr val="dk1"/>
-              </a:solidFill>
-            </a:endParaRPr>
-          </a:p>
-          <a:p>
-            <a:pPr marL="457200" lvl="0" indent="-342900" algn="l" rtl="0">
-              <a:spcBef>
-                <a:spcPts val="0"/>
-              </a:spcBef>
-              <a:spcAft>
-                <a:spcPts val="0"/>
-              </a:spcAft>
-              <a:buClr>
-                <a:schemeClr val="dk1"/>
-              </a:buClr>
-              <a:buSzPts val="1800"/>
-              <a:buChar char="-"/>
-            </a:pPr>
-            <a:endParaRPr dirty="0">
-              <a:solidFill>
-                <a:schemeClr val="dk1"/>
-              </a:solidFill>
-            </a:endParaRPr>
-          </a:p>
-          <a:p>
-            <a:pPr marL="0" lvl="0" indent="0" algn="l" rtl="0">
-              <a:spcBef>
-                <a:spcPts val="1200"/>
-              </a:spcBef>
-              <a:spcAft>
-                <a:spcPts val="0"/>
-              </a:spcAft>
-              <a:buNone/>
-            </a:pPr>
-            <a:r>
-              <a:rPr lang="de" sz="2800" b="1" dirty="0">
-                <a:solidFill>
-                  <a:srgbClr val="000000"/>
-                </a:solidFill>
-              </a:rPr>
-              <a:t>Prototype</a:t>
-            </a:r>
-            <a:endParaRPr dirty="0">
-              <a:solidFill>
-                <a:schemeClr val="dk1"/>
-              </a:solidFill>
-            </a:endParaRPr>
-          </a:p>
-          <a:p>
-            <a:pPr marL="457200" lvl="0" indent="0" algn="l" rtl="0">
-              <a:spcBef>
-                <a:spcPts val="1200"/>
-              </a:spcBef>
-              <a:spcAft>
-                <a:spcPts val="1200"/>
-              </a:spcAft>
-              <a:buNone/>
-            </a:pPr>
-            <a:endParaRPr i="1" dirty="0">
-              <a:solidFill>
-                <a:schemeClr val="dk1"/>
-              </a:solidFill>
-            </a:endParaRPr>
-          </a:p>
-        </p:txBody>
-      </p:sp>
-      <p:sp>
-        <p:nvSpPr>
-          <p:cNvPr id="197" name="Google Shape;197;p29"/>
-          <p:cNvSpPr txBox="1">
-            <a:spLocks noGrp="1"/>
-          </p:cNvSpPr>
-          <p:nvPr>
-            <p:ph type="body" idx="4294967295"/>
-          </p:nvPr>
-        </p:nvSpPr>
-        <p:spPr>
-          <a:xfrm>
-            <a:off x="8303475" y="546375"/>
-            <a:ext cx="532200" cy="638700"/>
-          </a:xfrm>
-          <a:prstGeom prst="rect">
-            <a:avLst/>
-          </a:prstGeom>
-          <a:noFill/>
-          <a:ln>
-            <a:noFill/>
-          </a:ln>
-        </p:spPr>
-        <p:txBody>
-          <a:bodyPr spcFirstLastPara="1" wrap="square" lIns="68575" tIns="34275" rIns="68575" bIns="34275" anchor="t" anchorCtr="0">
-            <a:noAutofit/>
-          </a:bodyPr>
-          <a:lstStyle/>
-          <a:p>
-            <a:pPr marL="0" marR="0" lvl="0" indent="0" algn="l" rtl="0">
-              <a:lnSpc>
-                <a:spcPct val="100000"/>
-              </a:lnSpc>
-              <a:spcBef>
-                <a:spcPts val="0"/>
-              </a:spcBef>
-              <a:spcAft>
-                <a:spcPts val="0"/>
-              </a:spcAft>
-              <a:buClr>
-                <a:schemeClr val="dk1"/>
-              </a:buClr>
-              <a:buFont typeface="Arial"/>
-              <a:buNone/>
-            </a:pPr>
-            <a:r>
-              <a:rPr lang="de" sz="3200" b="1">
-                <a:solidFill>
-                  <a:srgbClr val="CC0000"/>
-                </a:solidFill>
-                <a:latin typeface="Roboto"/>
-                <a:ea typeface="Roboto"/>
-                <a:cs typeface="Roboto"/>
-                <a:sym typeface="Roboto"/>
-              </a:rPr>
-              <a:t>4</a:t>
-            </a:r>
-            <a:endParaRPr sz="2500" b="1" i="1">
-              <a:solidFill>
-                <a:srgbClr val="000000"/>
-              </a:solidFill>
-            </a:endParaRPr>
-          </a:p>
-          <a:p>
-            <a:pPr marL="0" lvl="0" indent="0" algn="l" rtl="0">
-              <a:spcBef>
-                <a:spcPts val="1200"/>
-              </a:spcBef>
-              <a:spcAft>
-                <a:spcPts val="1200"/>
-              </a:spcAft>
-              <a:buNone/>
-            </a:pPr>
-            <a:endParaRPr i="1">
-              <a:solidFill>
-                <a:schemeClr val="dk1"/>
-              </a:solidFill>
-            </a:endParaRPr>
-          </a:p>
-        </p:txBody>
-      </p:sp>
-      <p:sp>
-        <p:nvSpPr>
-          <p:cNvPr id="198" name="Google Shape;198;p29"/>
-          <p:cNvSpPr txBox="1">
-            <a:spLocks noGrp="1"/>
-          </p:cNvSpPr>
-          <p:nvPr>
-            <p:ph type="body" idx="4294967295"/>
-          </p:nvPr>
-        </p:nvSpPr>
-        <p:spPr>
-          <a:xfrm>
-            <a:off x="4799050" y="261125"/>
-            <a:ext cx="3846900" cy="389700"/>
-          </a:xfrm>
-          <a:prstGeom prst="rect">
-            <a:avLst/>
-          </a:prstGeom>
-          <a:noFill/>
-          <a:ln>
-            <a:noFill/>
-          </a:ln>
-        </p:spPr>
-        <p:txBody>
-          <a:bodyPr spcFirstLastPara="1" wrap="square" lIns="68575" tIns="34275" rIns="68575" bIns="34275" anchor="t" anchorCtr="0">
-            <a:noAutofit/>
-          </a:bodyPr>
-          <a:lstStyle/>
-          <a:p>
-            <a:pPr marL="0" lvl="0" indent="0" algn="r" rtl="0">
-              <a:lnSpc>
-                <a:spcPct val="120000"/>
-              </a:lnSpc>
-              <a:spcBef>
-                <a:spcPts val="0"/>
-              </a:spcBef>
-              <a:spcAft>
-                <a:spcPts val="0"/>
-              </a:spcAft>
-              <a:buClr>
-                <a:schemeClr val="dk1"/>
-              </a:buClr>
-              <a:buSzPts val="1100"/>
-              <a:buFont typeface="Arial"/>
-              <a:buNone/>
-            </a:pPr>
-            <a:r>
-              <a:rPr lang="de" b="1" i="1">
-                <a:solidFill>
-                  <a:srgbClr val="CC0000"/>
-                </a:solidFill>
-                <a:highlight>
-                  <a:srgbClr val="FFFFFF"/>
-                </a:highlight>
-                <a:latin typeface="Roboto"/>
-                <a:ea typeface="Roboto"/>
-                <a:cs typeface="Roboto"/>
-                <a:sym typeface="Roboto"/>
-              </a:rPr>
-              <a:t>Vertical Farming</a:t>
-            </a:r>
-            <a:endParaRPr b="1" i="1">
-              <a:solidFill>
-                <a:srgbClr val="CC0000"/>
-              </a:solidFill>
-              <a:highlight>
-                <a:srgbClr val="FFFFFF"/>
-              </a:highlight>
-              <a:latin typeface="Roboto"/>
-              <a:ea typeface="Roboto"/>
-              <a:cs typeface="Roboto"/>
-              <a:sym typeface="Roboto"/>
-            </a:endParaRPr>
-          </a:p>
-          <a:p>
-            <a:pPr marL="0" lvl="0" indent="0" algn="r" rtl="0">
-              <a:spcBef>
-                <a:spcPts val="1200"/>
-              </a:spcBef>
-              <a:spcAft>
-                <a:spcPts val="1200"/>
-              </a:spcAft>
-              <a:buNone/>
-            </a:pPr>
-            <a:endParaRPr i="1">
-              <a:solidFill>
-                <a:schemeClr val="dk1"/>
-              </a:solidFill>
-            </a:endParaRPr>
-          </a:p>
-        </p:txBody>
-      </p:sp>
-    </p:spTree>
-  </p:cSld>
-  <p:clrMapOvr>
-    <a:masterClrMapping/>
-  </p:clrMapOvr>
-</p:sld>
-</file>
-
-<file path=ppt/slides/slide8.xml><?xml version="1.0" encoding="utf-8"?>
-<p:sld xmlns:a="http://schemas.openxmlformats.org/drawingml/2006/main" xmlns:r="http://schemas.openxmlformats.org/officeDocument/2006/relationships" xmlns:p="http://schemas.openxmlformats.org/presentationml/2006/main">
-  <p:cSld>
-    <p:bg>
-      <p:bgPr>
-        <a:solidFill>
-          <a:srgbClr val="FFFFFF"/>
-        </a:solidFill>
-        <a:effectLst/>
-      </p:bgPr>
-    </p:bg>
-    <p:spTree>
-      <p:nvGrpSpPr>
-        <p:cNvPr id="1" name="Shape 202"/>
-        <p:cNvGrpSpPr/>
-        <p:nvPr/>
-      </p:nvGrpSpPr>
-      <p:grpSpPr>
-        <a:xfrm>
-          <a:off x="0" y="0"/>
-          <a:ext cx="0" cy="0"/>
-          <a:chOff x="0" y="0"/>
-          <a:chExt cx="0" cy="0"/>
-        </a:xfrm>
-      </p:grpSpPr>
-      <p:pic>
-        <p:nvPicPr>
-          <p:cNvPr id="203" name="Google Shape;203;p30"/>
-          <p:cNvPicPr preferRelativeResize="0"/>
-          <p:nvPr/>
-        </p:nvPicPr>
-        <p:blipFill>
-          <a:blip r:embed="rId3">
-            <a:alphaModFix/>
-          </a:blip>
-          <a:stretch>
-            <a:fillRect/>
-          </a:stretch>
-        </p:blipFill>
-        <p:spPr>
-          <a:xfrm>
-            <a:off x="0" y="0"/>
-            <a:ext cx="9144003" cy="5143501"/>
-          </a:xfrm>
-          <a:prstGeom prst="rect">
-            <a:avLst/>
-          </a:prstGeom>
-          <a:noFill/>
-          <a:ln>
-            <a:noFill/>
-          </a:ln>
-        </p:spPr>
-      </p:pic>
-      <p:sp>
-        <p:nvSpPr>
-          <p:cNvPr id="204" name="Google Shape;204;p30"/>
-          <p:cNvSpPr txBox="1">
-            <a:spLocks noGrp="1"/>
-          </p:cNvSpPr>
-          <p:nvPr>
-            <p:ph type="body" idx="4294967295"/>
-          </p:nvPr>
-        </p:nvSpPr>
-        <p:spPr>
-          <a:xfrm>
-            <a:off x="420800" y="4050500"/>
-            <a:ext cx="6037500" cy="1092900"/>
-          </a:xfrm>
-          <a:prstGeom prst="rect">
-            <a:avLst/>
-          </a:prstGeom>
-          <a:noFill/>
-          <a:ln>
-            <a:noFill/>
-          </a:ln>
-        </p:spPr>
-        <p:txBody>
-          <a:bodyPr spcFirstLastPara="1" wrap="square" lIns="68575" tIns="34275" rIns="68575" bIns="34275" anchor="t" anchorCtr="0">
-            <a:noAutofit/>
-          </a:bodyPr>
-          <a:lstStyle/>
-          <a:p>
-            <a:pPr marL="0" marR="0" lvl="0" indent="0" algn="l" rtl="0">
-              <a:lnSpc>
-                <a:spcPct val="100000"/>
-              </a:lnSpc>
-              <a:spcBef>
-                <a:spcPts val="0"/>
-              </a:spcBef>
-              <a:spcAft>
-                <a:spcPts val="0"/>
-              </a:spcAft>
-              <a:buClr>
-                <a:schemeClr val="dk1"/>
-              </a:buClr>
-              <a:buFont typeface="Arial"/>
-              <a:buNone/>
-            </a:pPr>
-            <a:r>
-              <a:rPr lang="de" sz="2800" b="1" dirty="0">
-                <a:solidFill>
-                  <a:srgbClr val="000000"/>
-                </a:solidFill>
-              </a:rPr>
-              <a:t>Team: </a:t>
-            </a:r>
-            <a:r>
-              <a:rPr lang="de" dirty="0">
-                <a:solidFill>
-                  <a:schemeClr val="dk1"/>
-                </a:solidFill>
-              </a:rPr>
-              <a:t>Al Whoop, Robert Hop, Marella Pop </a:t>
-            </a:r>
-            <a:endParaRPr dirty="0">
-              <a:solidFill>
-                <a:schemeClr val="dk1"/>
-              </a:solidFill>
-            </a:endParaRPr>
-          </a:p>
-          <a:p>
-            <a:pPr marL="0" lvl="0" indent="0" algn="l" rtl="0">
-              <a:spcBef>
-                <a:spcPts val="1200"/>
-              </a:spcBef>
-              <a:spcAft>
-                <a:spcPts val="1200"/>
-              </a:spcAft>
-              <a:buClr>
-                <a:schemeClr val="dk1"/>
-              </a:buClr>
-              <a:buSzPts val="1100"/>
-              <a:buFont typeface="Arial"/>
-              <a:buNone/>
-            </a:pPr>
-            <a:endParaRPr sz="2400" i="1" dirty="0">
-              <a:solidFill>
-                <a:schemeClr val="dk1"/>
-              </a:solidFill>
-            </a:endParaRPr>
-          </a:p>
-        </p:txBody>
-      </p:sp>
-      <p:sp>
-        <p:nvSpPr>
-          <p:cNvPr id="205" name="Google Shape;205;p30"/>
-          <p:cNvSpPr txBox="1">
-            <a:spLocks noGrp="1"/>
-          </p:cNvSpPr>
-          <p:nvPr>
-            <p:ph type="body" idx="4294967295"/>
-          </p:nvPr>
-        </p:nvSpPr>
-        <p:spPr>
-          <a:xfrm>
-            <a:off x="420800" y="546375"/>
-            <a:ext cx="6571200" cy="3206100"/>
-          </a:xfrm>
-          <a:prstGeom prst="rect">
-            <a:avLst/>
-          </a:prstGeom>
-          <a:noFill/>
-          <a:ln>
-            <a:noFill/>
-          </a:ln>
-        </p:spPr>
-        <p:txBody>
-          <a:bodyPr spcFirstLastPara="1" wrap="square" lIns="68575" tIns="34275" rIns="68575" bIns="34275" anchor="t" anchorCtr="0">
-            <a:noAutofit/>
-          </a:bodyPr>
-          <a:lstStyle/>
-          <a:p>
-            <a:pPr marL="0" marR="0" lvl="0" indent="0" algn="l" rtl="0">
-              <a:lnSpc>
-                <a:spcPct val="100000"/>
-              </a:lnSpc>
-              <a:spcBef>
-                <a:spcPts val="0"/>
-              </a:spcBef>
-              <a:spcAft>
-                <a:spcPts val="0"/>
-              </a:spcAft>
-              <a:buClr>
-                <a:schemeClr val="dk1"/>
-              </a:buClr>
-              <a:buFont typeface="Arial"/>
-              <a:buNone/>
-            </a:pPr>
-            <a:r>
-              <a:rPr lang="de" sz="2800" b="1" dirty="0">
-                <a:solidFill>
-                  <a:srgbClr val="000000"/>
-                </a:solidFill>
-              </a:rPr>
-              <a:t>Ressources / Data</a:t>
-            </a:r>
-            <a:endParaRPr sz="2800" b="1" dirty="0">
-              <a:solidFill>
-                <a:srgbClr val="000000"/>
-              </a:solidFill>
-            </a:endParaRPr>
-          </a:p>
-          <a:p>
-            <a:pPr marL="457200" lvl="0" indent="-342900" algn="l" rtl="0">
-              <a:spcBef>
-                <a:spcPts val="1200"/>
-              </a:spcBef>
-              <a:spcAft>
-                <a:spcPts val="0"/>
-              </a:spcAft>
-              <a:buClr>
-                <a:schemeClr val="dk1"/>
-              </a:buClr>
-              <a:buSzPts val="1800"/>
-              <a:buChar char="-"/>
-            </a:pPr>
-            <a:r>
-              <a:rPr lang="de" dirty="0">
-                <a:solidFill>
-                  <a:schemeClr val="dk1"/>
-                </a:solidFill>
-              </a:rPr>
-              <a:t>Dezentralisierung: Zurück ins Quartier? </a:t>
-            </a:r>
-            <a:endParaRPr dirty="0">
-              <a:solidFill>
-                <a:schemeClr val="dk1"/>
-              </a:solidFill>
-            </a:endParaRPr>
-          </a:p>
-          <a:p>
-            <a:pPr marL="457200" lvl="0" indent="-342900" algn="l" rtl="0">
-              <a:spcBef>
-                <a:spcPts val="0"/>
-              </a:spcBef>
-              <a:spcAft>
-                <a:spcPts val="0"/>
-              </a:spcAft>
-              <a:buClr>
-                <a:schemeClr val="dk1"/>
-              </a:buClr>
-              <a:buSzPts val="1800"/>
-              <a:buChar char="-"/>
-            </a:pPr>
-            <a:r>
-              <a:rPr lang="de" dirty="0">
-                <a:solidFill>
-                  <a:schemeClr val="dk1"/>
-                </a:solidFill>
-              </a:rPr>
-              <a:t>Halböffentliche Containers bieten vielleicht mehr Kontrolle? </a:t>
-            </a:r>
-            <a:endParaRPr dirty="0">
-              <a:solidFill>
-                <a:schemeClr val="dk1"/>
-              </a:solidFill>
-            </a:endParaRPr>
-          </a:p>
-          <a:p>
-            <a:pPr marL="457200" lvl="0" indent="-342900" algn="l" rtl="0">
-              <a:spcBef>
-                <a:spcPts val="0"/>
-              </a:spcBef>
-              <a:spcAft>
-                <a:spcPts val="0"/>
-              </a:spcAft>
-              <a:buClr>
-                <a:schemeClr val="dk1"/>
-              </a:buClr>
-              <a:buSzPts val="1800"/>
-              <a:buChar char="-"/>
-            </a:pPr>
-            <a:r>
-              <a:rPr lang="de" dirty="0">
-                <a:solidFill>
-                  <a:schemeClr val="dk1"/>
-                </a:solidFill>
-              </a:rPr>
-              <a:t>Hotline bei Funktionsstörungen? </a:t>
-            </a:r>
-            <a:endParaRPr dirty="0">
-              <a:solidFill>
-                <a:schemeClr val="dk1"/>
-              </a:solidFill>
-            </a:endParaRPr>
-          </a:p>
-          <a:p>
-            <a:pPr marL="457200" lvl="0" indent="-342900" algn="l" rtl="0">
-              <a:spcBef>
-                <a:spcPts val="0"/>
-              </a:spcBef>
-              <a:spcAft>
-                <a:spcPts val="0"/>
-              </a:spcAft>
-              <a:buClr>
-                <a:schemeClr val="dk1"/>
-              </a:buClr>
-              <a:buSzPts val="1800"/>
-              <a:buChar char="-"/>
-            </a:pPr>
-            <a:r>
-              <a:rPr lang="de" dirty="0">
-                <a:solidFill>
-                  <a:schemeClr val="dk1"/>
-                </a:solidFill>
-              </a:rPr>
-              <a:t>Meldung über Füllstand, evtl. via IoT-Sensoren? </a:t>
-            </a:r>
-            <a:endParaRPr dirty="0">
-              <a:solidFill>
-                <a:schemeClr val="dk1"/>
-              </a:solidFill>
-            </a:endParaRPr>
-          </a:p>
-          <a:p>
-            <a:pPr marL="0" lvl="0" indent="0" algn="l" rtl="0">
-              <a:spcBef>
-                <a:spcPts val="1200"/>
-              </a:spcBef>
-              <a:spcAft>
-                <a:spcPts val="1200"/>
-              </a:spcAft>
-              <a:buNone/>
-            </a:pPr>
-            <a:r>
-              <a:rPr lang="de" sz="2800" b="1" dirty="0">
-                <a:solidFill>
-                  <a:schemeClr val="dk1"/>
-                </a:solidFill>
-              </a:rPr>
-              <a:t>Next steps</a:t>
-            </a:r>
-            <a:br>
-              <a:rPr lang="de" dirty="0">
-                <a:solidFill>
-                  <a:schemeClr val="dk1"/>
-                </a:solidFill>
-              </a:rPr>
-            </a:br>
-            <a:endParaRPr i="1" dirty="0">
-              <a:solidFill>
-                <a:schemeClr val="dk1"/>
-              </a:solidFill>
-            </a:endParaRPr>
-          </a:p>
-        </p:txBody>
-      </p:sp>
-      <p:sp>
-        <p:nvSpPr>
-          <p:cNvPr id="207" name="Google Shape;207;p30"/>
-          <p:cNvSpPr txBox="1">
-            <a:spLocks noGrp="1"/>
-          </p:cNvSpPr>
-          <p:nvPr>
-            <p:ph type="body" idx="4294967295"/>
-          </p:nvPr>
-        </p:nvSpPr>
-        <p:spPr>
-          <a:xfrm>
-            <a:off x="8303475" y="546375"/>
-            <a:ext cx="532200" cy="638700"/>
-          </a:xfrm>
-          <a:prstGeom prst="rect">
-            <a:avLst/>
-          </a:prstGeom>
-          <a:noFill/>
-          <a:ln>
-            <a:noFill/>
-          </a:ln>
-        </p:spPr>
-        <p:txBody>
-          <a:bodyPr spcFirstLastPara="1" wrap="square" lIns="68575" tIns="34275" rIns="68575" bIns="34275" anchor="t" anchorCtr="0">
-            <a:noAutofit/>
-          </a:bodyPr>
-          <a:lstStyle/>
-          <a:p>
-            <a:pPr marL="0" marR="0" lvl="0" indent="0" algn="l" rtl="0">
-              <a:lnSpc>
-                <a:spcPct val="100000"/>
-              </a:lnSpc>
-              <a:spcBef>
-                <a:spcPts val="0"/>
-              </a:spcBef>
-              <a:spcAft>
-                <a:spcPts val="0"/>
-              </a:spcAft>
-              <a:buClr>
-                <a:schemeClr val="dk1"/>
-              </a:buClr>
-              <a:buFont typeface="Arial"/>
-              <a:buNone/>
-            </a:pPr>
-            <a:r>
-              <a:rPr lang="de" sz="3200" b="1">
-                <a:solidFill>
-                  <a:srgbClr val="CC0000"/>
-                </a:solidFill>
-                <a:latin typeface="Roboto"/>
-                <a:ea typeface="Roboto"/>
-                <a:cs typeface="Roboto"/>
-                <a:sym typeface="Roboto"/>
-              </a:rPr>
-              <a:t>4</a:t>
-            </a:r>
-            <a:endParaRPr sz="2500" b="1" i="1">
-              <a:solidFill>
-                <a:srgbClr val="000000"/>
-              </a:solidFill>
-            </a:endParaRPr>
-          </a:p>
-          <a:p>
-            <a:pPr marL="0" lvl="0" indent="0" algn="l" rtl="0">
-              <a:spcBef>
-                <a:spcPts val="1200"/>
-              </a:spcBef>
-              <a:spcAft>
-                <a:spcPts val="1200"/>
-              </a:spcAft>
-              <a:buNone/>
-            </a:pPr>
-            <a:endParaRPr i="1">
-              <a:solidFill>
-                <a:schemeClr val="dk1"/>
-              </a:solidFill>
-            </a:endParaRPr>
-          </a:p>
-        </p:txBody>
-      </p:sp>
-      <p:sp>
-        <p:nvSpPr>
-          <p:cNvPr id="208" name="Google Shape;208;p30"/>
-          <p:cNvSpPr txBox="1">
-            <a:spLocks noGrp="1"/>
-          </p:cNvSpPr>
-          <p:nvPr>
-            <p:ph type="body" idx="4294967295"/>
-          </p:nvPr>
-        </p:nvSpPr>
-        <p:spPr>
-          <a:xfrm>
-            <a:off x="4799050" y="261125"/>
-            <a:ext cx="3846900" cy="389700"/>
-          </a:xfrm>
-          <a:prstGeom prst="rect">
-            <a:avLst/>
-          </a:prstGeom>
-          <a:noFill/>
-          <a:ln>
-            <a:noFill/>
-          </a:ln>
-        </p:spPr>
-        <p:txBody>
-          <a:bodyPr spcFirstLastPara="1" wrap="square" lIns="68575" tIns="34275" rIns="68575" bIns="34275" anchor="t" anchorCtr="0">
-            <a:noAutofit/>
-          </a:bodyPr>
-          <a:lstStyle/>
-          <a:p>
-            <a:pPr marL="0" lvl="0" indent="0" algn="r" rtl="0">
-              <a:lnSpc>
-                <a:spcPct val="120000"/>
-              </a:lnSpc>
-              <a:spcBef>
-                <a:spcPts val="0"/>
-              </a:spcBef>
-              <a:spcAft>
-                <a:spcPts val="0"/>
-              </a:spcAft>
-              <a:buClr>
-                <a:schemeClr val="dk1"/>
-              </a:buClr>
-              <a:buSzPts val="1100"/>
-              <a:buFont typeface="Arial"/>
-              <a:buNone/>
-            </a:pPr>
-            <a:r>
-              <a:rPr lang="de" b="1" i="1">
-                <a:solidFill>
-                  <a:srgbClr val="CC0000"/>
-                </a:solidFill>
-                <a:highlight>
-                  <a:srgbClr val="FFFFFF"/>
-                </a:highlight>
-                <a:latin typeface="Roboto"/>
-                <a:ea typeface="Roboto"/>
-                <a:cs typeface="Roboto"/>
-                <a:sym typeface="Roboto"/>
-              </a:rPr>
-              <a:t>Vertical Farming</a:t>
-            </a:r>
-            <a:endParaRPr b="1" i="1">
-              <a:solidFill>
-                <a:srgbClr val="CC0000"/>
-              </a:solidFill>
-              <a:highlight>
-                <a:srgbClr val="FFFFFF"/>
-              </a:highlight>
-              <a:latin typeface="Roboto"/>
-              <a:ea typeface="Roboto"/>
-              <a:cs typeface="Roboto"/>
-              <a:sym typeface="Roboto"/>
-            </a:endParaRPr>
-          </a:p>
-          <a:p>
-            <a:pPr marL="0" lvl="0" indent="0" algn="r" rtl="0">
-              <a:spcBef>
-                <a:spcPts val="1200"/>
-              </a:spcBef>
-              <a:spcAft>
-                <a:spcPts val="1200"/>
-              </a:spcAft>
-              <a:buNone/>
-            </a:pPr>
-            <a:endParaRPr i="1">
-              <a:solidFill>
-                <a:schemeClr val="dk1"/>
-              </a:solidFill>
-            </a:endParaRPr>
-          </a:p>
-        </p:txBody>
-      </p:sp>
-    </p:spTree>
-  </p:cSld>
-  <p:clrMapOvr>
-    <a:masterClrMapping/>
-  </p:clrMapOvr>
-</p:sld>
-</file>
-
 <file path=ppt/theme/theme1.xml><?xml version="1.0" encoding="utf-8"?>
 <a:theme xmlns:a="http://schemas.openxmlformats.org/drawingml/2006/main" name="Simple Light">
   <a:themeElements>

</xml_diff>